<commit_message>
Update report & Slide
</commit_message>
<xml_diff>
--- a/Document/Slide 1.pptx
+++ b/Document/Slide 1.pptx
@@ -4065,6 +4065,13 @@
         </dgm:presLayoutVars>
       </dgm:prSet>
       <dgm:spPr/>
+      <dgm:t>
+        <a:bodyPr/>
+        <a:lstStyle/>
+        <a:p>
+          <a:endParaRPr lang="en-US"/>
+        </a:p>
+      </dgm:t>
     </dgm:pt>
     <dgm:pt modelId="{7B9E1549-F93C-4A21-B35E-4A2BD937EC4E}" type="pres">
       <dgm:prSet presAssocID="{48853750-86F5-47F4-A68B-CDFB38C1BADB}" presName="Name1" presStyleCnt="0"/>
@@ -4081,6 +4088,13 @@
     <dgm:pt modelId="{0A1705CF-3D07-4F80-B9C8-188472D19C3A}" type="pres">
       <dgm:prSet presAssocID="{48853750-86F5-47F4-A68B-CDFB38C1BADB}" presName="conn" presStyleLbl="parChTrans1D2" presStyleIdx="0" presStyleCnt="1"/>
       <dgm:spPr/>
+      <dgm:t>
+        <a:bodyPr/>
+        <a:lstStyle/>
+        <a:p>
+          <a:endParaRPr lang="en-US"/>
+        </a:p>
+      </dgm:t>
     </dgm:pt>
     <dgm:pt modelId="{9DF66842-7A2C-4808-891D-65D5791853DB}" type="pres">
       <dgm:prSet presAssocID="{48853750-86F5-47F4-A68B-CDFB38C1BADB}" presName="extraNode" presStyleLbl="node1" presStyleIdx="0" presStyleCnt="5"/>
@@ -4143,6 +4157,13 @@
         </dgm:presLayoutVars>
       </dgm:prSet>
       <dgm:spPr/>
+      <dgm:t>
+        <a:bodyPr/>
+        <a:lstStyle/>
+        <a:p>
+          <a:endParaRPr lang="en-US"/>
+        </a:p>
+      </dgm:t>
     </dgm:pt>
     <dgm:pt modelId="{8D8109EC-D1A9-4C82-8A80-D4B347322662}" type="pres">
       <dgm:prSet presAssocID="{CA9A96A0-0D82-4953-BDD6-2411773D25A6}" presName="accent_3" presStyleCnt="0"/>
@@ -4159,6 +4180,13 @@
         </dgm:presLayoutVars>
       </dgm:prSet>
       <dgm:spPr/>
+      <dgm:t>
+        <a:bodyPr/>
+        <a:lstStyle/>
+        <a:p>
+          <a:endParaRPr lang="en-US"/>
+        </a:p>
+      </dgm:t>
     </dgm:pt>
     <dgm:pt modelId="{71CB5DD0-81E6-4A6C-AFD8-0E0BB04DFF3A}" type="pres">
       <dgm:prSet presAssocID="{83878C97-B938-4426-99E0-893A9A57EFA7}" presName="accent_4" presStyleCnt="0"/>
@@ -4445,6 +4473,13 @@
         </dgm:presLayoutVars>
       </dgm:prSet>
       <dgm:spPr/>
+      <dgm:t>
+        <a:bodyPr/>
+        <a:lstStyle/>
+        <a:p>
+          <a:endParaRPr lang="en-US"/>
+        </a:p>
+      </dgm:t>
     </dgm:pt>
     <dgm:pt modelId="{7B9E1549-F93C-4A21-B35E-4A2BD937EC4E}" type="pres">
       <dgm:prSet presAssocID="{48853750-86F5-47F4-A68B-CDFB38C1BADB}" presName="Name1" presStyleCnt="0"/>
@@ -4461,6 +4496,13 @@
     <dgm:pt modelId="{0A1705CF-3D07-4F80-B9C8-188472D19C3A}" type="pres">
       <dgm:prSet presAssocID="{48853750-86F5-47F4-A68B-CDFB38C1BADB}" presName="conn" presStyleLbl="parChTrans1D2" presStyleIdx="0" presStyleCnt="1"/>
       <dgm:spPr/>
+      <dgm:t>
+        <a:bodyPr/>
+        <a:lstStyle/>
+        <a:p>
+          <a:endParaRPr lang="en-US"/>
+        </a:p>
+      </dgm:t>
     </dgm:pt>
     <dgm:pt modelId="{9DF66842-7A2C-4808-891D-65D5791853DB}" type="pres">
       <dgm:prSet presAssocID="{48853750-86F5-47F4-A68B-CDFB38C1BADB}" presName="extraNode" presStyleLbl="node1" presStyleIdx="0" presStyleCnt="5"/>
@@ -4523,6 +4565,13 @@
         </dgm:presLayoutVars>
       </dgm:prSet>
       <dgm:spPr/>
+      <dgm:t>
+        <a:bodyPr/>
+        <a:lstStyle/>
+        <a:p>
+          <a:endParaRPr lang="en-US"/>
+        </a:p>
+      </dgm:t>
     </dgm:pt>
     <dgm:pt modelId="{8D8109EC-D1A9-4C82-8A80-D4B347322662}" type="pres">
       <dgm:prSet presAssocID="{CA9A96A0-0D82-4953-BDD6-2411773D25A6}" presName="accent_3" presStyleCnt="0"/>
@@ -4539,6 +4588,13 @@
         </dgm:presLayoutVars>
       </dgm:prSet>
       <dgm:spPr/>
+      <dgm:t>
+        <a:bodyPr/>
+        <a:lstStyle/>
+        <a:p>
+          <a:endParaRPr lang="en-US"/>
+        </a:p>
+      </dgm:t>
     </dgm:pt>
     <dgm:pt modelId="{71CB5DD0-81E6-4A6C-AFD8-0E0BB04DFF3A}" type="pres">
       <dgm:prSet presAssocID="{83878C97-B938-4426-99E0-893A9A57EFA7}" presName="accent_4" presStyleCnt="0"/>
@@ -4580,8 +4636,8 @@
     <dgm:cxn modelId="{32D6BBE2-8D1A-455A-9EDA-724EC9316219}" srcId="{48853750-86F5-47F4-A68B-CDFB38C1BADB}" destId="{823BD1AD-7A2F-4080-BD6D-E30C59BF5106}" srcOrd="4" destOrd="0" parTransId="{82745903-5349-463D-934A-27B90416165C}" sibTransId="{182C066A-25D8-450C-AED8-B6D4FFAD8546}"/>
     <dgm:cxn modelId="{AB8E6FAC-70BE-4160-A1E9-84BA0C1A78EA}" type="presOf" srcId="{648699EF-CE30-4200-87B3-5A453C54D683}" destId="{0A1705CF-3D07-4F80-B9C8-188472D19C3A}" srcOrd="0" destOrd="0" presId="urn:microsoft.com/office/officeart/2008/layout/VerticalCurvedList"/>
     <dgm:cxn modelId="{3899A25C-526A-463B-A6AC-1A46BA466C0D}" srcId="{48853750-86F5-47F4-A68B-CDFB38C1BADB}" destId="{4CD1CC2C-70EF-4317-9704-EDC1B41AAA23}" srcOrd="0" destOrd="0" parTransId="{7AFAFFDE-9CDA-49CC-B769-30F1804F805B}" sibTransId="{648699EF-CE30-4200-87B3-5A453C54D683}"/>
+    <dgm:cxn modelId="{92C1C3CB-39A1-4ECB-BCC7-9FB335563A07}" type="presOf" srcId="{2651EFA8-E0A2-437A-A385-3AA7D525DE49}" destId="{3CDC2285-DB10-44CD-A533-75D696704BCC}" srcOrd="0" destOrd="0" presId="urn:microsoft.com/office/officeart/2008/layout/VerticalCurvedList"/>
     <dgm:cxn modelId="{E12C1991-F5BE-4109-B7C3-9613542D394C}" srcId="{48853750-86F5-47F4-A68B-CDFB38C1BADB}" destId="{83878C97-B938-4426-99E0-893A9A57EFA7}" srcOrd="3" destOrd="0" parTransId="{37100349-AC7C-437D-841C-F7DB97E73406}" sibTransId="{C601174E-3D4D-4B37-A0DE-EBE55C5F4074}"/>
-    <dgm:cxn modelId="{92C1C3CB-39A1-4ECB-BCC7-9FB335563A07}" type="presOf" srcId="{2651EFA8-E0A2-437A-A385-3AA7D525DE49}" destId="{3CDC2285-DB10-44CD-A533-75D696704BCC}" srcOrd="0" destOrd="0" presId="urn:microsoft.com/office/officeart/2008/layout/VerticalCurvedList"/>
     <dgm:cxn modelId="{14777445-E5C3-4284-8184-068F361E2555}" type="presOf" srcId="{4CD1CC2C-70EF-4317-9704-EDC1B41AAA23}" destId="{8CB177D9-2261-4297-ACF6-18E32A9A49CC}" srcOrd="0" destOrd="0" presId="urn:microsoft.com/office/officeart/2008/layout/VerticalCurvedList"/>
     <dgm:cxn modelId="{57113198-2627-438E-B0C5-548C5585AB4E}" type="presOf" srcId="{CA9A96A0-0D82-4953-BDD6-2411773D25A6}" destId="{C8CD1FDF-CF66-4CDA-91B8-967AA9005C42}" srcOrd="0" destOrd="0" presId="urn:microsoft.com/office/officeart/2008/layout/VerticalCurvedList"/>
     <dgm:cxn modelId="{01A9C5C5-19B8-460D-AF9A-2F162320D9AC}" type="presOf" srcId="{823BD1AD-7A2F-4080-BD6D-E30C59BF5106}" destId="{026555A1-F82F-49AA-B67C-269C23B61047}" srcOrd="0" destOrd="0" presId="urn:microsoft.com/office/officeart/2008/layout/VerticalCurvedList"/>
@@ -4825,6 +4881,13 @@
         </dgm:presLayoutVars>
       </dgm:prSet>
       <dgm:spPr/>
+      <dgm:t>
+        <a:bodyPr/>
+        <a:lstStyle/>
+        <a:p>
+          <a:endParaRPr lang="en-US"/>
+        </a:p>
+      </dgm:t>
     </dgm:pt>
     <dgm:pt modelId="{7B9E1549-F93C-4A21-B35E-4A2BD937EC4E}" type="pres">
       <dgm:prSet presAssocID="{48853750-86F5-47F4-A68B-CDFB38C1BADB}" presName="Name1" presStyleCnt="0"/>
@@ -4841,6 +4904,13 @@
     <dgm:pt modelId="{0A1705CF-3D07-4F80-B9C8-188472D19C3A}" type="pres">
       <dgm:prSet presAssocID="{48853750-86F5-47F4-A68B-CDFB38C1BADB}" presName="conn" presStyleLbl="parChTrans1D2" presStyleIdx="0" presStyleCnt="1"/>
       <dgm:spPr/>
+      <dgm:t>
+        <a:bodyPr/>
+        <a:lstStyle/>
+        <a:p>
+          <a:endParaRPr lang="en-US"/>
+        </a:p>
+      </dgm:t>
     </dgm:pt>
     <dgm:pt modelId="{9DF66842-7A2C-4808-891D-65D5791853DB}" type="pres">
       <dgm:prSet presAssocID="{48853750-86F5-47F4-A68B-CDFB38C1BADB}" presName="extraNode" presStyleLbl="node1" presStyleIdx="0" presStyleCnt="5"/>
@@ -4903,6 +4973,13 @@
         </dgm:presLayoutVars>
       </dgm:prSet>
       <dgm:spPr/>
+      <dgm:t>
+        <a:bodyPr/>
+        <a:lstStyle/>
+        <a:p>
+          <a:endParaRPr lang="en-US"/>
+        </a:p>
+      </dgm:t>
     </dgm:pt>
     <dgm:pt modelId="{8D8109EC-D1A9-4C82-8A80-D4B347322662}" type="pres">
       <dgm:prSet presAssocID="{CA9A96A0-0D82-4953-BDD6-2411773D25A6}" presName="accent_3" presStyleCnt="0"/>
@@ -4919,6 +4996,13 @@
         </dgm:presLayoutVars>
       </dgm:prSet>
       <dgm:spPr/>
+      <dgm:t>
+        <a:bodyPr/>
+        <a:lstStyle/>
+        <a:p>
+          <a:endParaRPr lang="en-US"/>
+        </a:p>
+      </dgm:t>
     </dgm:pt>
     <dgm:pt modelId="{71CB5DD0-81E6-4A6C-AFD8-0E0BB04DFF3A}" type="pres">
       <dgm:prSet presAssocID="{83878C97-B938-4426-99E0-893A9A57EFA7}" presName="accent_4" presStyleCnt="0"/>
@@ -4953,18 +5037,18 @@
     </dgm:pt>
   </dgm:ptLst>
   <dgm:cxnLst>
+    <dgm:cxn modelId="{7017D5F5-13C2-4D7E-A8FB-6CCF87E9F132}" type="presOf" srcId="{2651EFA8-E0A2-437A-A385-3AA7D525DE49}" destId="{3CDC2285-DB10-44CD-A533-75D696704BCC}" srcOrd="0" destOrd="0" presId="urn:microsoft.com/office/officeart/2008/layout/VerticalCurvedList"/>
+    <dgm:cxn modelId="{45F03B4B-C266-4D9C-9107-A05D7D45366F}" type="presOf" srcId="{48853750-86F5-47F4-A68B-CDFB38C1BADB}" destId="{9345C3D5-F3DD-4597-97D1-96FA8E14123A}" srcOrd="0" destOrd="0" presId="urn:microsoft.com/office/officeart/2008/layout/VerticalCurvedList"/>
+    <dgm:cxn modelId="{6A2651C9-BAF7-4C48-A758-29F1221800E2}" type="presOf" srcId="{83878C97-B938-4426-99E0-893A9A57EFA7}" destId="{35FB1C4D-3294-4725-9F66-1E0BE6ED7C81}" srcOrd="0" destOrd="0" presId="urn:microsoft.com/office/officeart/2008/layout/VerticalCurvedList"/>
     <dgm:cxn modelId="{2871B512-BFFD-4F6C-ABC5-9B86070FCA28}" srcId="{48853750-86F5-47F4-A68B-CDFB38C1BADB}" destId="{CA9A96A0-0D82-4953-BDD6-2411773D25A6}" srcOrd="2" destOrd="0" parTransId="{6D5AB6A6-D595-4B05-8BEA-60119FF6992A}" sibTransId="{F6C38C87-C43A-4847-8ACE-34BBC5B1A251}"/>
-    <dgm:cxn modelId="{7017D5F5-13C2-4D7E-A8FB-6CCF87E9F132}" type="presOf" srcId="{2651EFA8-E0A2-437A-A385-3AA7D525DE49}" destId="{3CDC2285-DB10-44CD-A533-75D696704BCC}" srcOrd="0" destOrd="0" presId="urn:microsoft.com/office/officeart/2008/layout/VerticalCurvedList"/>
+    <dgm:cxn modelId="{62B6621F-9B30-49B0-B3EB-6C6F626F0293}" type="presOf" srcId="{4CD1CC2C-70EF-4317-9704-EDC1B41AAA23}" destId="{8CB177D9-2261-4297-ACF6-18E32A9A49CC}" srcOrd="0" destOrd="0" presId="urn:microsoft.com/office/officeart/2008/layout/VerticalCurvedList"/>
     <dgm:cxn modelId="{77B93CFB-B5EC-4AF1-A6B9-6B21C521D552}" srcId="{48853750-86F5-47F4-A68B-CDFB38C1BADB}" destId="{2651EFA8-E0A2-437A-A385-3AA7D525DE49}" srcOrd="1" destOrd="0" parTransId="{88DAF907-679F-42BC-98C7-DCFDBB6CD6A4}" sibTransId="{B5068519-58C7-41F0-AB53-252BF836EB27}"/>
+    <dgm:cxn modelId="{F0B36DC7-BD33-41A8-86A9-A2E91D42ECD1}" type="presOf" srcId="{648699EF-CE30-4200-87B3-5A453C54D683}" destId="{0A1705CF-3D07-4F80-B9C8-188472D19C3A}" srcOrd="0" destOrd="0" presId="urn:microsoft.com/office/officeart/2008/layout/VerticalCurvedList"/>
+    <dgm:cxn modelId="{7A72AB8C-29F4-44F9-9250-8B83864576EF}" type="presOf" srcId="{823BD1AD-7A2F-4080-BD6D-E30C59BF5106}" destId="{026555A1-F82F-49AA-B67C-269C23B61047}" srcOrd="0" destOrd="0" presId="urn:microsoft.com/office/officeart/2008/layout/VerticalCurvedList"/>
+    <dgm:cxn modelId="{3899A25C-526A-463B-A6AC-1A46BA466C0D}" srcId="{48853750-86F5-47F4-A68B-CDFB38C1BADB}" destId="{4CD1CC2C-70EF-4317-9704-EDC1B41AAA23}" srcOrd="0" destOrd="0" parTransId="{7AFAFFDE-9CDA-49CC-B769-30F1804F805B}" sibTransId="{648699EF-CE30-4200-87B3-5A453C54D683}"/>
     <dgm:cxn modelId="{32D6BBE2-8D1A-455A-9EDA-724EC9316219}" srcId="{48853750-86F5-47F4-A68B-CDFB38C1BADB}" destId="{823BD1AD-7A2F-4080-BD6D-E30C59BF5106}" srcOrd="4" destOrd="0" parTransId="{82745903-5349-463D-934A-27B90416165C}" sibTransId="{182C066A-25D8-450C-AED8-B6D4FFAD8546}"/>
     <dgm:cxn modelId="{53FDA6A4-FF00-4C83-8E06-B114B0376FF2}" type="presOf" srcId="{CA9A96A0-0D82-4953-BDD6-2411773D25A6}" destId="{C8CD1FDF-CF66-4CDA-91B8-967AA9005C42}" srcOrd="0" destOrd="0" presId="urn:microsoft.com/office/officeart/2008/layout/VerticalCurvedList"/>
-    <dgm:cxn modelId="{7A72AB8C-29F4-44F9-9250-8B83864576EF}" type="presOf" srcId="{823BD1AD-7A2F-4080-BD6D-E30C59BF5106}" destId="{026555A1-F82F-49AA-B67C-269C23B61047}" srcOrd="0" destOrd="0" presId="urn:microsoft.com/office/officeart/2008/layout/VerticalCurvedList"/>
-    <dgm:cxn modelId="{3899A25C-526A-463B-A6AC-1A46BA466C0D}" srcId="{48853750-86F5-47F4-A68B-CDFB38C1BADB}" destId="{4CD1CC2C-70EF-4317-9704-EDC1B41AAA23}" srcOrd="0" destOrd="0" parTransId="{7AFAFFDE-9CDA-49CC-B769-30F1804F805B}" sibTransId="{648699EF-CE30-4200-87B3-5A453C54D683}"/>
     <dgm:cxn modelId="{E12C1991-F5BE-4109-B7C3-9613542D394C}" srcId="{48853750-86F5-47F4-A68B-CDFB38C1BADB}" destId="{83878C97-B938-4426-99E0-893A9A57EFA7}" srcOrd="3" destOrd="0" parTransId="{37100349-AC7C-437D-841C-F7DB97E73406}" sibTransId="{C601174E-3D4D-4B37-A0DE-EBE55C5F4074}"/>
-    <dgm:cxn modelId="{45F03B4B-C266-4D9C-9107-A05D7D45366F}" type="presOf" srcId="{48853750-86F5-47F4-A68B-CDFB38C1BADB}" destId="{9345C3D5-F3DD-4597-97D1-96FA8E14123A}" srcOrd="0" destOrd="0" presId="urn:microsoft.com/office/officeart/2008/layout/VerticalCurvedList"/>
-    <dgm:cxn modelId="{F0B36DC7-BD33-41A8-86A9-A2E91D42ECD1}" type="presOf" srcId="{648699EF-CE30-4200-87B3-5A453C54D683}" destId="{0A1705CF-3D07-4F80-B9C8-188472D19C3A}" srcOrd="0" destOrd="0" presId="urn:microsoft.com/office/officeart/2008/layout/VerticalCurvedList"/>
-    <dgm:cxn modelId="{6A2651C9-BAF7-4C48-A758-29F1221800E2}" type="presOf" srcId="{83878C97-B938-4426-99E0-893A9A57EFA7}" destId="{35FB1C4D-3294-4725-9F66-1E0BE6ED7C81}" srcOrd="0" destOrd="0" presId="urn:microsoft.com/office/officeart/2008/layout/VerticalCurvedList"/>
-    <dgm:cxn modelId="{62B6621F-9B30-49B0-B3EB-6C6F626F0293}" type="presOf" srcId="{4CD1CC2C-70EF-4317-9704-EDC1B41AAA23}" destId="{8CB177D9-2261-4297-ACF6-18E32A9A49CC}" srcOrd="0" destOrd="0" presId="urn:microsoft.com/office/officeart/2008/layout/VerticalCurvedList"/>
     <dgm:cxn modelId="{793B8B4B-165C-4B71-B0C6-FF8FEB722851}" type="presParOf" srcId="{9345C3D5-F3DD-4597-97D1-96FA8E14123A}" destId="{7B9E1549-F93C-4A21-B35E-4A2BD937EC4E}" srcOrd="0" destOrd="0" presId="urn:microsoft.com/office/officeart/2008/layout/VerticalCurvedList"/>
     <dgm:cxn modelId="{F8D1DCD7-E843-44C1-BD54-0EC768F36A49}" type="presParOf" srcId="{7B9E1549-F93C-4A21-B35E-4A2BD937EC4E}" destId="{B547696C-CC9F-4997-80C6-BACBC6DDD533}" srcOrd="0" destOrd="0" presId="urn:microsoft.com/office/officeart/2008/layout/VerticalCurvedList"/>
     <dgm:cxn modelId="{9BFA35C1-9F43-4CEE-ABA2-7E223618552B}" type="presParOf" srcId="{B547696C-CC9F-4997-80C6-BACBC6DDD533}" destId="{D548C936-9BBC-4DBF-B0BC-8DBBD3BC75D0}" srcOrd="0" destOrd="0" presId="urn:microsoft.com/office/officeart/2008/layout/VerticalCurvedList"/>
@@ -5181,6 +5265,13 @@
         </dgm:presLayoutVars>
       </dgm:prSet>
       <dgm:spPr/>
+      <dgm:t>
+        <a:bodyPr/>
+        <a:lstStyle/>
+        <a:p>
+          <a:endParaRPr lang="en-US"/>
+        </a:p>
+      </dgm:t>
     </dgm:pt>
     <dgm:pt modelId="{6584923E-0A2B-4826-B39F-A56823A86774}" type="pres">
       <dgm:prSet presAssocID="{B3B1ABCC-E0B0-40C1-8BB4-169EC0269C4A}" presName="bullet4b" presStyleLbl="node1" presStyleIdx="1" presStyleCnt="4"/>
@@ -5193,6 +5284,13 @@
         </dgm:presLayoutVars>
       </dgm:prSet>
       <dgm:spPr/>
+      <dgm:t>
+        <a:bodyPr/>
+        <a:lstStyle/>
+        <a:p>
+          <a:endParaRPr lang="en-US"/>
+        </a:p>
+      </dgm:t>
     </dgm:pt>
     <dgm:pt modelId="{F481D530-1EF8-4B65-9DDB-6C535467E7C7}" type="pres">
       <dgm:prSet presAssocID="{E1BBB819-A59E-47ED-88E1-5D45DB3806C7}" presName="bullet4c" presStyleLbl="node1" presStyleIdx="2" presStyleCnt="4"/>
@@ -5205,6 +5303,13 @@
         </dgm:presLayoutVars>
       </dgm:prSet>
       <dgm:spPr/>
+      <dgm:t>
+        <a:bodyPr/>
+        <a:lstStyle/>
+        <a:p>
+          <a:endParaRPr lang="en-US"/>
+        </a:p>
+      </dgm:t>
     </dgm:pt>
     <dgm:pt modelId="{E155ECB4-412E-4D8C-B3E4-349D0839A56A}" type="pres">
       <dgm:prSet presAssocID="{49DA7A38-B87D-47B0-A67C-9A9D19FF1245}" presName="bullet4d" presStyleLbl="node1" presStyleIdx="3" presStyleCnt="4"/>
@@ -5217,18 +5322,25 @@
         </dgm:presLayoutVars>
       </dgm:prSet>
       <dgm:spPr/>
+      <dgm:t>
+        <a:bodyPr/>
+        <a:lstStyle/>
+        <a:p>
+          <a:endParaRPr lang="en-US"/>
+        </a:p>
+      </dgm:t>
     </dgm:pt>
   </dgm:ptLst>
   <dgm:cxnLst>
+    <dgm:cxn modelId="{93175189-A5DB-490B-828B-BC5220779BBD}" type="presOf" srcId="{49DA7A38-B87D-47B0-A67C-9A9D19FF1245}" destId="{F34A29A6-73AA-4F99-9070-F4B513D02FEA}" srcOrd="0" destOrd="0" presId="urn:microsoft.com/office/officeart/2005/8/layout/arrow2"/>
+    <dgm:cxn modelId="{1D5C8B17-9142-4319-A667-66E6EF3A3EAB}" srcId="{B630BB80-98BD-4E22-A1B6-9780809558A0}" destId="{E1BBB819-A59E-47ED-88E1-5D45DB3806C7}" srcOrd="2" destOrd="0" parTransId="{070C0EB7-ADA2-4CB7-9653-91DA0FEAA8C3}" sibTransId="{4151BE1D-2899-4305-AC2D-8E659CDAA0C8}"/>
+    <dgm:cxn modelId="{9D6D3957-117C-41B8-83BC-830B9D639E1B}" type="presOf" srcId="{B3B1ABCC-E0B0-40C1-8BB4-169EC0269C4A}" destId="{DC1DEF45-F15B-4A58-90C8-D74C987B0D4C}" srcOrd="0" destOrd="0" presId="urn:microsoft.com/office/officeart/2005/8/layout/arrow2"/>
+    <dgm:cxn modelId="{81BC537A-14B2-42C2-A0AB-C57321FA68AD}" type="presOf" srcId="{E1BBB819-A59E-47ED-88E1-5D45DB3806C7}" destId="{094FDC71-2294-4061-A9E6-42D044F5E339}" srcOrd="0" destOrd="0" presId="urn:microsoft.com/office/officeart/2005/8/layout/arrow2"/>
+    <dgm:cxn modelId="{6B9EE43C-A355-4822-8088-EAACA82E6768}" srcId="{B630BB80-98BD-4E22-A1B6-9780809558A0}" destId="{B3B1ABCC-E0B0-40C1-8BB4-169EC0269C4A}" srcOrd="1" destOrd="0" parTransId="{445F62ED-53EE-465E-961F-773E685B906A}" sibTransId="{9F5C0A2C-C24F-4DAD-BF5E-E14CFCA3BFE5}"/>
+    <dgm:cxn modelId="{9C585C23-5B46-411B-B080-491A82EC7777}" srcId="{B630BB80-98BD-4E22-A1B6-9780809558A0}" destId="{BF590B1F-3341-463B-B9B8-03EEE723A5EB}" srcOrd="0" destOrd="0" parTransId="{B8413FDE-9D25-4189-8605-5E7F67D19ED5}" sibTransId="{6E400D82-7E12-41A3-8668-6B63E23E67F7}"/>
+    <dgm:cxn modelId="{2ABC7FD8-2379-42EF-9A7B-55DF8CC4AF04}" type="presOf" srcId="{B630BB80-98BD-4E22-A1B6-9780809558A0}" destId="{AAB3D4FB-896F-48C9-8684-CF960E78BC42}" srcOrd="0" destOrd="0" presId="urn:microsoft.com/office/officeart/2005/8/layout/arrow2"/>
+    <dgm:cxn modelId="{A64DBA61-CD04-4877-888D-544F6DFC51DA}" srcId="{B630BB80-98BD-4E22-A1B6-9780809558A0}" destId="{49DA7A38-B87D-47B0-A67C-9A9D19FF1245}" srcOrd="3" destOrd="0" parTransId="{10C26C96-5A42-488F-883C-FB7F172441FB}" sibTransId="{32403402-3FB0-4A1A-B634-5BB52A3CC486}"/>
     <dgm:cxn modelId="{A03E68A3-A2A5-4318-9623-544FFA0ACBC9}" type="presOf" srcId="{BF590B1F-3341-463B-B9B8-03EEE723A5EB}" destId="{3CB2F8EB-0D9B-4138-AAC6-EAF17E05128E}" srcOrd="0" destOrd="0" presId="urn:microsoft.com/office/officeart/2005/8/layout/arrow2"/>
-    <dgm:cxn modelId="{81BC537A-14B2-42C2-A0AB-C57321FA68AD}" type="presOf" srcId="{E1BBB819-A59E-47ED-88E1-5D45DB3806C7}" destId="{094FDC71-2294-4061-A9E6-42D044F5E339}" srcOrd="0" destOrd="0" presId="urn:microsoft.com/office/officeart/2005/8/layout/arrow2"/>
-    <dgm:cxn modelId="{9D6D3957-117C-41B8-83BC-830B9D639E1B}" type="presOf" srcId="{B3B1ABCC-E0B0-40C1-8BB4-169EC0269C4A}" destId="{DC1DEF45-F15B-4A58-90C8-D74C987B0D4C}" srcOrd="0" destOrd="0" presId="urn:microsoft.com/office/officeart/2005/8/layout/arrow2"/>
-    <dgm:cxn modelId="{1D5C8B17-9142-4319-A667-66E6EF3A3EAB}" srcId="{B630BB80-98BD-4E22-A1B6-9780809558A0}" destId="{E1BBB819-A59E-47ED-88E1-5D45DB3806C7}" srcOrd="2" destOrd="0" parTransId="{070C0EB7-ADA2-4CB7-9653-91DA0FEAA8C3}" sibTransId="{4151BE1D-2899-4305-AC2D-8E659CDAA0C8}"/>
-    <dgm:cxn modelId="{2ABC7FD8-2379-42EF-9A7B-55DF8CC4AF04}" type="presOf" srcId="{B630BB80-98BD-4E22-A1B6-9780809558A0}" destId="{AAB3D4FB-896F-48C9-8684-CF960E78BC42}" srcOrd="0" destOrd="0" presId="urn:microsoft.com/office/officeart/2005/8/layout/arrow2"/>
-    <dgm:cxn modelId="{6B9EE43C-A355-4822-8088-EAACA82E6768}" srcId="{B630BB80-98BD-4E22-A1B6-9780809558A0}" destId="{B3B1ABCC-E0B0-40C1-8BB4-169EC0269C4A}" srcOrd="1" destOrd="0" parTransId="{445F62ED-53EE-465E-961F-773E685B906A}" sibTransId="{9F5C0A2C-C24F-4DAD-BF5E-E14CFCA3BFE5}"/>
-    <dgm:cxn modelId="{A64DBA61-CD04-4877-888D-544F6DFC51DA}" srcId="{B630BB80-98BD-4E22-A1B6-9780809558A0}" destId="{49DA7A38-B87D-47B0-A67C-9A9D19FF1245}" srcOrd="3" destOrd="0" parTransId="{10C26C96-5A42-488F-883C-FB7F172441FB}" sibTransId="{32403402-3FB0-4A1A-B634-5BB52A3CC486}"/>
-    <dgm:cxn modelId="{93175189-A5DB-490B-828B-BC5220779BBD}" type="presOf" srcId="{49DA7A38-B87D-47B0-A67C-9A9D19FF1245}" destId="{F34A29A6-73AA-4F99-9070-F4B513D02FEA}" srcOrd="0" destOrd="0" presId="urn:microsoft.com/office/officeart/2005/8/layout/arrow2"/>
-    <dgm:cxn modelId="{9C585C23-5B46-411B-B080-491A82EC7777}" srcId="{B630BB80-98BD-4E22-A1B6-9780809558A0}" destId="{BF590B1F-3341-463B-B9B8-03EEE723A5EB}" srcOrd="0" destOrd="0" parTransId="{B8413FDE-9D25-4189-8605-5E7F67D19ED5}" sibTransId="{6E400D82-7E12-41A3-8668-6B63E23E67F7}"/>
     <dgm:cxn modelId="{1CC1F605-7221-4874-8225-721F27BAFED7}" type="presParOf" srcId="{AAB3D4FB-896F-48C9-8684-CF960E78BC42}" destId="{A970C72E-B8F6-4917-AD25-5FB607B371C9}" srcOrd="0" destOrd="0" presId="urn:microsoft.com/office/officeart/2005/8/layout/arrow2"/>
     <dgm:cxn modelId="{91780B10-623D-4CD9-8B8C-E5FEE526B261}" type="presParOf" srcId="{AAB3D4FB-896F-48C9-8684-CF960E78BC42}" destId="{CEEDC13E-1496-412B-95DB-BFB4AD6EC165}" srcOrd="1" destOrd="0" presId="urn:microsoft.com/office/officeart/2005/8/layout/arrow2"/>
     <dgm:cxn modelId="{88F995A9-7951-4DDF-BE9F-FD6B44740117}" type="presParOf" srcId="{CEEDC13E-1496-412B-95DB-BFB4AD6EC165}" destId="{4EEE0D28-2916-4BA1-8BA8-E3961638C410}" srcOrd="0" destOrd="0" presId="urn:microsoft.com/office/officeart/2005/8/layout/arrow2"/>
@@ -5421,6 +5533,13 @@
         </dgm:presLayoutVars>
       </dgm:prSet>
       <dgm:spPr/>
+      <dgm:t>
+        <a:bodyPr/>
+        <a:lstStyle/>
+        <a:p>
+          <a:endParaRPr lang="en-US"/>
+        </a:p>
+      </dgm:t>
     </dgm:pt>
     <dgm:pt modelId="{E7658916-89B9-4E0E-BFFD-C2AC9D751C91}" type="pres">
       <dgm:prSet presAssocID="{D48256E8-7D5A-4513-836B-6A56126FBE17}" presName="diamond" presStyleLbl="bgShp" presStyleIdx="0" presStyleCnt="1" custLinFactNeighborX="1250" custLinFactNeighborY="21875"/>
@@ -5435,6 +5554,13 @@
         </dgm:presLayoutVars>
       </dgm:prSet>
       <dgm:spPr/>
+      <dgm:t>
+        <a:bodyPr/>
+        <a:lstStyle/>
+        <a:p>
+          <a:endParaRPr lang="en-US"/>
+        </a:p>
+      </dgm:t>
     </dgm:pt>
     <dgm:pt modelId="{4D02D694-07B2-4801-AAC2-41A116BB6E32}" type="pres">
       <dgm:prSet presAssocID="{D48256E8-7D5A-4513-836B-6A56126FBE17}" presName="quad2" presStyleLbl="node1" presStyleIdx="1" presStyleCnt="4">
@@ -5445,6 +5571,13 @@
         </dgm:presLayoutVars>
       </dgm:prSet>
       <dgm:spPr/>
+      <dgm:t>
+        <a:bodyPr/>
+        <a:lstStyle/>
+        <a:p>
+          <a:endParaRPr lang="en-US"/>
+        </a:p>
+      </dgm:t>
     </dgm:pt>
     <dgm:pt modelId="{D8D36418-B4CF-4609-B814-E5C80D7BB375}" type="pres">
       <dgm:prSet presAssocID="{D48256E8-7D5A-4513-836B-6A56126FBE17}" presName="quad3" presStyleLbl="node1" presStyleIdx="2" presStyleCnt="4">
@@ -5455,6 +5588,13 @@
         </dgm:presLayoutVars>
       </dgm:prSet>
       <dgm:spPr/>
+      <dgm:t>
+        <a:bodyPr/>
+        <a:lstStyle/>
+        <a:p>
+          <a:endParaRPr lang="en-US"/>
+        </a:p>
+      </dgm:t>
     </dgm:pt>
     <dgm:pt modelId="{462B5000-9A7D-4BEE-A744-0F22DCCA5E20}" type="pres">
       <dgm:prSet presAssocID="{D48256E8-7D5A-4513-836B-6A56126FBE17}" presName="quad4" presStyleLbl="node1" presStyleIdx="3" presStyleCnt="4">
@@ -5465,6 +5605,13 @@
         </dgm:presLayoutVars>
       </dgm:prSet>
       <dgm:spPr/>
+      <dgm:t>
+        <a:bodyPr/>
+        <a:lstStyle/>
+        <a:p>
+          <a:endParaRPr lang="en-US"/>
+        </a:p>
+      </dgm:t>
     </dgm:pt>
   </dgm:ptLst>
   <dgm:cxnLst>
@@ -25385,10 +25532,6 @@
           <a:bodyPr/>
           <a:lstStyle/>
           <a:p>
-            <a:r>
-              <a:rPr lang="en-US" dirty="0" smtClean="0"/>
-              <a:t>Develop system on web-base </a:t>
-            </a:r>
             <a:endParaRPr lang="en-US" dirty="0"/>
           </a:p>
         </p:txBody>
@@ -26510,7 +26653,6 @@
               <a:rPr lang="en-US" sz="3600" dirty="0"/>
               <a:t>2</a:t>
             </a:r>
-            <a:endParaRPr lang="en-US" sz="3600" dirty="0"/>
           </a:p>
         </p:txBody>
       </p:sp>
@@ -26540,7 +26682,6 @@
               <a:rPr lang="en-US" sz="3600" dirty="0"/>
               <a:t>3</a:t>
             </a:r>
-            <a:endParaRPr lang="en-US" sz="3600" dirty="0"/>
           </a:p>
         </p:txBody>
       </p:sp>
@@ -26570,7 +26711,6 @@
               <a:rPr lang="en-US" sz="3600" dirty="0"/>
               <a:t>4</a:t>
             </a:r>
-            <a:endParaRPr lang="en-US" sz="3600" dirty="0"/>
           </a:p>
         </p:txBody>
       </p:sp>
@@ -26600,7 +26740,6 @@
               <a:rPr lang="en-US" sz="3600" dirty="0"/>
               <a:t>5</a:t>
             </a:r>
-            <a:endParaRPr lang="en-US" sz="3600" dirty="0"/>
           </a:p>
         </p:txBody>
       </p:sp>

</xml_diff>

<commit_message>
review Slide 1.pptx Signed-off-by: Nguyen Xuan Quyet <quyetnx00818@fpt.edu.vn>
</commit_message>
<xml_diff>
--- a/Document/Slide 1.pptx
+++ b/Document/Slide 1.pptx
@@ -5,7 +5,7 @@
     <p:sldMasterId id="2147483696" r:id="rId1"/>
   </p:sldMasterIdLst>
   <p:notesMasterIdLst>
-    <p:notesMasterId r:id="rId15"/>
+    <p:notesMasterId r:id="rId16"/>
   </p:notesMasterIdLst>
   <p:sldIdLst>
     <p:sldId id="256" r:id="rId2"/>
@@ -17,10 +17,11 @@
     <p:sldId id="265" r:id="rId8"/>
     <p:sldId id="266" r:id="rId9"/>
     <p:sldId id="267" r:id="rId10"/>
-    <p:sldId id="262" r:id="rId11"/>
-    <p:sldId id="263" r:id="rId12"/>
-    <p:sldId id="268" r:id="rId13"/>
-    <p:sldId id="264" r:id="rId14"/>
+    <p:sldId id="269" r:id="rId11"/>
+    <p:sldId id="262" r:id="rId12"/>
+    <p:sldId id="263" r:id="rId13"/>
+    <p:sldId id="268" r:id="rId14"/>
+    <p:sldId id="264" r:id="rId15"/>
   </p:sldIdLst>
   <p:sldSz cx="9144000" cy="6858000" type="screen4x3"/>
   <p:notesSz cx="6858000" cy="9144000"/>
@@ -5037,18 +5038,18 @@
     </dgm:pt>
   </dgm:ptLst>
   <dgm:cxnLst>
+    <dgm:cxn modelId="{2871B512-BFFD-4F6C-ABC5-9B86070FCA28}" srcId="{48853750-86F5-47F4-A68B-CDFB38C1BADB}" destId="{CA9A96A0-0D82-4953-BDD6-2411773D25A6}" srcOrd="2" destOrd="0" parTransId="{6D5AB6A6-D595-4B05-8BEA-60119FF6992A}" sibTransId="{F6C38C87-C43A-4847-8ACE-34BBC5B1A251}"/>
     <dgm:cxn modelId="{7017D5F5-13C2-4D7E-A8FB-6CCF87E9F132}" type="presOf" srcId="{2651EFA8-E0A2-437A-A385-3AA7D525DE49}" destId="{3CDC2285-DB10-44CD-A533-75D696704BCC}" srcOrd="0" destOrd="0" presId="urn:microsoft.com/office/officeart/2008/layout/VerticalCurvedList"/>
-    <dgm:cxn modelId="{45F03B4B-C266-4D9C-9107-A05D7D45366F}" type="presOf" srcId="{48853750-86F5-47F4-A68B-CDFB38C1BADB}" destId="{9345C3D5-F3DD-4597-97D1-96FA8E14123A}" srcOrd="0" destOrd="0" presId="urn:microsoft.com/office/officeart/2008/layout/VerticalCurvedList"/>
-    <dgm:cxn modelId="{6A2651C9-BAF7-4C48-A758-29F1221800E2}" type="presOf" srcId="{83878C97-B938-4426-99E0-893A9A57EFA7}" destId="{35FB1C4D-3294-4725-9F66-1E0BE6ED7C81}" srcOrd="0" destOrd="0" presId="urn:microsoft.com/office/officeart/2008/layout/VerticalCurvedList"/>
-    <dgm:cxn modelId="{2871B512-BFFD-4F6C-ABC5-9B86070FCA28}" srcId="{48853750-86F5-47F4-A68B-CDFB38C1BADB}" destId="{CA9A96A0-0D82-4953-BDD6-2411773D25A6}" srcOrd="2" destOrd="0" parTransId="{6D5AB6A6-D595-4B05-8BEA-60119FF6992A}" sibTransId="{F6C38C87-C43A-4847-8ACE-34BBC5B1A251}"/>
-    <dgm:cxn modelId="{62B6621F-9B30-49B0-B3EB-6C6F626F0293}" type="presOf" srcId="{4CD1CC2C-70EF-4317-9704-EDC1B41AAA23}" destId="{8CB177D9-2261-4297-ACF6-18E32A9A49CC}" srcOrd="0" destOrd="0" presId="urn:microsoft.com/office/officeart/2008/layout/VerticalCurvedList"/>
     <dgm:cxn modelId="{77B93CFB-B5EC-4AF1-A6B9-6B21C521D552}" srcId="{48853750-86F5-47F4-A68B-CDFB38C1BADB}" destId="{2651EFA8-E0A2-437A-A385-3AA7D525DE49}" srcOrd="1" destOrd="0" parTransId="{88DAF907-679F-42BC-98C7-DCFDBB6CD6A4}" sibTransId="{B5068519-58C7-41F0-AB53-252BF836EB27}"/>
-    <dgm:cxn modelId="{F0B36DC7-BD33-41A8-86A9-A2E91D42ECD1}" type="presOf" srcId="{648699EF-CE30-4200-87B3-5A453C54D683}" destId="{0A1705CF-3D07-4F80-B9C8-188472D19C3A}" srcOrd="0" destOrd="0" presId="urn:microsoft.com/office/officeart/2008/layout/VerticalCurvedList"/>
+    <dgm:cxn modelId="{32D6BBE2-8D1A-455A-9EDA-724EC9316219}" srcId="{48853750-86F5-47F4-A68B-CDFB38C1BADB}" destId="{823BD1AD-7A2F-4080-BD6D-E30C59BF5106}" srcOrd="4" destOrd="0" parTransId="{82745903-5349-463D-934A-27B90416165C}" sibTransId="{182C066A-25D8-450C-AED8-B6D4FFAD8546}"/>
+    <dgm:cxn modelId="{53FDA6A4-FF00-4C83-8E06-B114B0376FF2}" type="presOf" srcId="{CA9A96A0-0D82-4953-BDD6-2411773D25A6}" destId="{C8CD1FDF-CF66-4CDA-91B8-967AA9005C42}" srcOrd="0" destOrd="0" presId="urn:microsoft.com/office/officeart/2008/layout/VerticalCurvedList"/>
     <dgm:cxn modelId="{7A72AB8C-29F4-44F9-9250-8B83864576EF}" type="presOf" srcId="{823BD1AD-7A2F-4080-BD6D-E30C59BF5106}" destId="{026555A1-F82F-49AA-B67C-269C23B61047}" srcOrd="0" destOrd="0" presId="urn:microsoft.com/office/officeart/2008/layout/VerticalCurvedList"/>
     <dgm:cxn modelId="{3899A25C-526A-463B-A6AC-1A46BA466C0D}" srcId="{48853750-86F5-47F4-A68B-CDFB38C1BADB}" destId="{4CD1CC2C-70EF-4317-9704-EDC1B41AAA23}" srcOrd="0" destOrd="0" parTransId="{7AFAFFDE-9CDA-49CC-B769-30F1804F805B}" sibTransId="{648699EF-CE30-4200-87B3-5A453C54D683}"/>
-    <dgm:cxn modelId="{32D6BBE2-8D1A-455A-9EDA-724EC9316219}" srcId="{48853750-86F5-47F4-A68B-CDFB38C1BADB}" destId="{823BD1AD-7A2F-4080-BD6D-E30C59BF5106}" srcOrd="4" destOrd="0" parTransId="{82745903-5349-463D-934A-27B90416165C}" sibTransId="{182C066A-25D8-450C-AED8-B6D4FFAD8546}"/>
-    <dgm:cxn modelId="{53FDA6A4-FF00-4C83-8E06-B114B0376FF2}" type="presOf" srcId="{CA9A96A0-0D82-4953-BDD6-2411773D25A6}" destId="{C8CD1FDF-CF66-4CDA-91B8-967AA9005C42}" srcOrd="0" destOrd="0" presId="urn:microsoft.com/office/officeart/2008/layout/VerticalCurvedList"/>
     <dgm:cxn modelId="{E12C1991-F5BE-4109-B7C3-9613542D394C}" srcId="{48853750-86F5-47F4-A68B-CDFB38C1BADB}" destId="{83878C97-B938-4426-99E0-893A9A57EFA7}" srcOrd="3" destOrd="0" parTransId="{37100349-AC7C-437D-841C-F7DB97E73406}" sibTransId="{C601174E-3D4D-4B37-A0DE-EBE55C5F4074}"/>
+    <dgm:cxn modelId="{45F03B4B-C266-4D9C-9107-A05D7D45366F}" type="presOf" srcId="{48853750-86F5-47F4-A68B-CDFB38C1BADB}" destId="{9345C3D5-F3DD-4597-97D1-96FA8E14123A}" srcOrd="0" destOrd="0" presId="urn:microsoft.com/office/officeart/2008/layout/VerticalCurvedList"/>
+    <dgm:cxn modelId="{F0B36DC7-BD33-41A8-86A9-A2E91D42ECD1}" type="presOf" srcId="{648699EF-CE30-4200-87B3-5A453C54D683}" destId="{0A1705CF-3D07-4F80-B9C8-188472D19C3A}" srcOrd="0" destOrd="0" presId="urn:microsoft.com/office/officeart/2008/layout/VerticalCurvedList"/>
+    <dgm:cxn modelId="{6A2651C9-BAF7-4C48-A758-29F1221800E2}" type="presOf" srcId="{83878C97-B938-4426-99E0-893A9A57EFA7}" destId="{35FB1C4D-3294-4725-9F66-1E0BE6ED7C81}" srcOrd="0" destOrd="0" presId="urn:microsoft.com/office/officeart/2008/layout/VerticalCurvedList"/>
+    <dgm:cxn modelId="{62B6621F-9B30-49B0-B3EB-6C6F626F0293}" type="presOf" srcId="{4CD1CC2C-70EF-4317-9704-EDC1B41AAA23}" destId="{8CB177D9-2261-4297-ACF6-18E32A9A49CC}" srcOrd="0" destOrd="0" presId="urn:microsoft.com/office/officeart/2008/layout/VerticalCurvedList"/>
     <dgm:cxn modelId="{793B8B4B-165C-4B71-B0C6-FF8FEB722851}" type="presParOf" srcId="{9345C3D5-F3DD-4597-97D1-96FA8E14123A}" destId="{7B9E1549-F93C-4A21-B35E-4A2BD937EC4E}" srcOrd="0" destOrd="0" presId="urn:microsoft.com/office/officeart/2008/layout/VerticalCurvedList"/>
     <dgm:cxn modelId="{F8D1DCD7-E843-44C1-BD54-0EC768F36A49}" type="presParOf" srcId="{7B9E1549-F93C-4A21-B35E-4A2BD937EC4E}" destId="{B547696C-CC9F-4997-80C6-BACBC6DDD533}" srcOrd="0" destOrd="0" presId="urn:microsoft.com/office/officeart/2008/layout/VerticalCurvedList"/>
     <dgm:cxn modelId="{9BFA35C1-9F43-4CEE-ABA2-7E223618552B}" type="presParOf" srcId="{B547696C-CC9F-4997-80C6-BACBC6DDD533}" destId="{D548C936-9BBC-4DBF-B0BC-8DBBD3BC75D0}" srcOrd="0" destOrd="0" presId="urn:microsoft.com/office/officeart/2008/layout/VerticalCurvedList"/>
@@ -21124,7 +21125,7 @@
           <a:p>
             <a:fld id="{B2A8E5E7-6E75-4793-B8F8-1DCB7F4244A5}" type="datetimeFigureOut">
               <a:rPr lang="en-US" smtClean="0"/>
-              <a:t>5/14/2012</a:t>
+              <a:t>5/17/2012</a:t>
             </a:fld>
             <a:endParaRPr lang="en-US"/>
           </a:p>
@@ -21649,7 +21650,7 @@
           <a:p>
             <a:fld id="{652A7157-71EC-4FC4-9250-D3BE2C4860DA}" type="datetime1">
               <a:rPr lang="en-US" smtClean="0"/>
-              <a:t>5/14/2012</a:t>
+              <a:t>5/17/2012</a:t>
             </a:fld>
             <a:endParaRPr lang="en-US"/>
           </a:p>
@@ -21818,7 +21819,7 @@
           <a:p>
             <a:fld id="{FC2C6A11-AF48-4A7C-B9E5-02FAAE1D3BE3}" type="datetime1">
               <a:rPr lang="en-US" smtClean="0"/>
-              <a:t>5/14/2012</a:t>
+              <a:t>5/17/2012</a:t>
             </a:fld>
             <a:endParaRPr lang="en-US"/>
           </a:p>
@@ -21997,7 +21998,7 @@
           <a:p>
             <a:fld id="{B4045FBE-C519-48D0-8835-370CDF6ADE34}" type="datetime1">
               <a:rPr lang="en-US" smtClean="0"/>
-              <a:t>5/14/2012</a:t>
+              <a:t>5/17/2012</a:t>
             </a:fld>
             <a:endParaRPr lang="en-US"/>
           </a:p>
@@ -22166,7 +22167,7 @@
           <a:p>
             <a:fld id="{253B33E8-7A2D-45B6-A163-D868F5B7C992}" type="datetime1">
               <a:rPr lang="en-US" smtClean="0"/>
-              <a:t>5/14/2012</a:t>
+              <a:t>5/17/2012</a:t>
             </a:fld>
             <a:endParaRPr lang="en-US"/>
           </a:p>
@@ -22412,7 +22413,7 @@
           <a:p>
             <a:fld id="{B2069DB8-D2BF-4475-B8C9-77768390DC31}" type="datetime1">
               <a:rPr lang="en-US" smtClean="0"/>
-              <a:t>5/14/2012</a:t>
+              <a:t>5/17/2012</a:t>
             </a:fld>
             <a:endParaRPr lang="en-US"/>
           </a:p>
@@ -22680,7 +22681,7 @@
           <a:p>
             <a:fld id="{53E0FCFB-33AF-4B70-8B7E-510206FEE59A}" type="datetime1">
               <a:rPr lang="en-US" smtClean="0"/>
-              <a:t>5/14/2012</a:t>
+              <a:t>5/17/2012</a:t>
             </a:fld>
             <a:endParaRPr lang="en-US"/>
           </a:p>
@@ -23062,7 +23063,7 @@
           <a:p>
             <a:fld id="{76E5ED2F-5367-4F55-AD5C-FF38F6F04695}" type="datetime1">
               <a:rPr lang="en-US" smtClean="0"/>
-              <a:t>5/14/2012</a:t>
+              <a:t>5/17/2012</a:t>
             </a:fld>
             <a:endParaRPr lang="en-US"/>
           </a:p>
@@ -23216,7 +23217,7 @@
           <a:p>
             <a:fld id="{4BDFABDC-7B98-4607-9160-656824FD4648}" type="datetime1">
               <a:rPr lang="en-US" smtClean="0"/>
-              <a:t>5/14/2012</a:t>
+              <a:t>5/17/2012</a:t>
             </a:fld>
             <a:endParaRPr lang="en-US"/>
           </a:p>
@@ -23310,7 +23311,7 @@
           <a:p>
             <a:fld id="{75D0D92D-4D9B-4CDB-9699-2F75486B7B63}" type="datetime1">
               <a:rPr lang="en-US" smtClean="0"/>
-              <a:t>5/14/2012</a:t>
+              <a:t>5/17/2012</a:t>
             </a:fld>
             <a:endParaRPr lang="en-US"/>
           </a:p>
@@ -23575,7 +23576,7 @@
           <a:p>
             <a:fld id="{1D5AA65D-2FA2-47D8-AE24-CA3BD4F847F5}" type="datetime1">
               <a:rPr lang="en-US" smtClean="0"/>
-              <a:t>5/14/2012</a:t>
+              <a:t>5/17/2012</a:t>
             </a:fld>
             <a:endParaRPr lang="en-US"/>
           </a:p>
@@ -23867,7 +23868,7 @@
           <a:p>
             <a:fld id="{A505ED83-A3B9-40F9-B2E5-A5D8E69641A8}" type="datetime1">
               <a:rPr lang="en-US" smtClean="0"/>
-              <a:t>5/14/2012</a:t>
+              <a:t>5/17/2012</a:t>
             </a:fld>
             <a:endParaRPr lang="en-US"/>
           </a:p>
@@ -24642,7 +24643,7 @@
           <a:p>
             <a:fld id="{426DBFA3-C814-4C12-8DC7-E1EC51D7DD8E}" type="datetime1">
               <a:rPr lang="en-US" smtClean="0"/>
-              <a:t>5/14/2012</a:t>
+              <a:t>5/17/2012</a:t>
             </a:fld>
             <a:endParaRPr lang="en-US"/>
           </a:p>
@@ -25402,7 +25403,7 @@
           <a:p>
             <a:fld id="{2AB80635-CCBA-478D-AC2C-65B597111D75}" type="datetime1">
               <a:rPr lang="en-US" smtClean="0"/>
-              <a:t>5/14/2012</a:t>
+              <a:t>5/17/2012</a:t>
             </a:fld>
             <a:endParaRPr lang="en-US"/>
           </a:p>
@@ -25503,39 +25504,45 @@
         </p:nvSpPr>
         <p:spPr/>
         <p:txBody>
-          <a:bodyPr>
-            <a:normAutofit/>
-          </a:bodyPr>
+          <a:bodyPr/>
           <a:lstStyle/>
           <a:p>
-            <a:pPr lvl="0"/>
             <a:r>
-              <a:rPr lang="en-US" dirty="0" smtClean="0"/>
-              <a:t>Improvement</a:t>
+              <a:rPr lang="en-US" dirty="0"/>
+              <a:t>Function and requirement</a:t>
             </a:r>
-            <a:endParaRPr lang="en-US" dirty="0"/>
           </a:p>
         </p:txBody>
       </p:sp>
-      <p:sp>
-        <p:nvSpPr>
-          <p:cNvPr id="3" name="Content Placeholder 2"/>
-          <p:cNvSpPr>
-            <a:spLocks noGrp="1"/>
-          </p:cNvSpPr>
+      <p:pic>
+        <p:nvPicPr>
+          <p:cNvPr id="7" name="Content Placeholder 6"/>
+          <p:cNvPicPr>
+            <a:picLocks noGrp="1" noChangeAspect="1"/>
+          </p:cNvPicPr>
           <p:nvPr>
             <p:ph idx="1"/>
           </p:nvPr>
-        </p:nvSpPr>
-        <p:spPr/>
-        <p:txBody>
-          <a:bodyPr/>
-          <a:lstStyle/>
-          <a:p>
-            <a:endParaRPr lang="en-US" dirty="0"/>
-          </a:p>
-        </p:txBody>
-      </p:sp>
+        </p:nvPicPr>
+        <p:blipFill>
+          <a:blip r:embed="rId2">
+            <a:extLst>
+              <a:ext uri="{28A0092B-C50C-407E-A947-70E740481C1C}">
+                <a14:useLocalDpi xmlns:a14="http://schemas.microsoft.com/office/drawing/2010/main" val="0"/>
+              </a:ext>
+            </a:extLst>
+          </a:blip>
+          <a:stretch>
+            <a:fillRect/>
+          </a:stretch>
+        </p:blipFill>
+        <p:spPr>
+          <a:xfrm>
+            <a:off x="457200" y="1998752"/>
+            <a:ext cx="8229600" cy="4262258"/>
+          </a:xfrm>
+        </p:spPr>
+      </p:pic>
       <p:sp>
         <p:nvSpPr>
           <p:cNvPr id="4" name="Date Placeholder 3"/>
@@ -25551,9 +25558,9 @@
           <a:bodyPr/>
           <a:lstStyle/>
           <a:p>
-            <a:fld id="{15BF1EF9-59AA-43E8-8BFA-F5BFB2E45B67}" type="datetime1">
+            <a:fld id="{253B33E8-7A2D-45B6-A163-D868F5B7C992}" type="datetime1">
               <a:rPr lang="en-US" smtClean="0"/>
-              <a:t>5/14/2012</a:t>
+              <a:t>5/17/2012</a:t>
             </a:fld>
             <a:endParaRPr lang="en-US"/>
           </a:p>
@@ -25608,6 +25615,175 @@
     </p:spTree>
     <p:extLst>
       <p:ext uri="{BB962C8B-B14F-4D97-AF65-F5344CB8AC3E}">
+        <p14:creationId xmlns:p14="http://schemas.microsoft.com/office/powerpoint/2010/main" val="1950060998"/>
+      </p:ext>
+    </p:extLst>
+  </p:cSld>
+  <p:clrMapOvr>
+    <a:masterClrMapping/>
+  </p:clrMapOvr>
+</p:sld>
+</file>
+
+<file path=ppt/slides/slide11.xml><?xml version="1.0" encoding="utf-8"?>
+<p:sld xmlns:a="http://schemas.openxmlformats.org/drawingml/2006/main" xmlns:r="http://schemas.openxmlformats.org/officeDocument/2006/relationships" xmlns:p="http://schemas.openxmlformats.org/presentationml/2006/main">
+  <p:cSld>
+    <p:spTree>
+      <p:nvGrpSpPr>
+        <p:cNvPr id="1" name=""/>
+        <p:cNvGrpSpPr/>
+        <p:nvPr/>
+      </p:nvGrpSpPr>
+      <p:grpSpPr>
+        <a:xfrm>
+          <a:off x="0" y="0"/>
+          <a:ext cx="0" cy="0"/>
+          <a:chOff x="0" y="0"/>
+          <a:chExt cx="0" cy="0"/>
+        </a:xfrm>
+      </p:grpSpPr>
+      <p:sp>
+        <p:nvSpPr>
+          <p:cNvPr id="2" name="Title 1"/>
+          <p:cNvSpPr>
+            <a:spLocks noGrp="1"/>
+          </p:cNvSpPr>
+          <p:nvPr>
+            <p:ph type="title"/>
+          </p:nvPr>
+        </p:nvSpPr>
+        <p:spPr/>
+        <p:txBody>
+          <a:bodyPr>
+            <a:normAutofit/>
+          </a:bodyPr>
+          <a:lstStyle/>
+          <a:p>
+            <a:pPr lvl="0"/>
+            <a:r>
+              <a:rPr lang="en-US" dirty="0" smtClean="0"/>
+              <a:t>Improvement</a:t>
+            </a:r>
+            <a:endParaRPr lang="en-US" dirty="0"/>
+          </a:p>
+        </p:txBody>
+      </p:sp>
+      <p:sp>
+        <p:nvSpPr>
+          <p:cNvPr id="3" name="Content Placeholder 2"/>
+          <p:cNvSpPr>
+            <a:spLocks noGrp="1"/>
+          </p:cNvSpPr>
+          <p:nvPr>
+            <p:ph idx="1"/>
+          </p:nvPr>
+        </p:nvSpPr>
+        <p:spPr/>
+        <p:txBody>
+          <a:bodyPr/>
+          <a:lstStyle/>
+          <a:p>
+            <a:r>
+              <a:rPr lang="en-US" dirty="0" smtClean="0"/>
+              <a:t>Compare with existing system:</a:t>
+            </a:r>
+          </a:p>
+          <a:p>
+            <a:pPr lvl="1"/>
+            <a:r>
+              <a:rPr lang="en-US" dirty="0" smtClean="0"/>
+              <a:t>Find shortest path to support delivery</a:t>
+            </a:r>
+          </a:p>
+          <a:p>
+            <a:pPr lvl="1"/>
+            <a:r>
+              <a:rPr lang="en-US" dirty="0" smtClean="0"/>
+              <a:t>Contain more function to improve customer support services.</a:t>
+            </a:r>
+          </a:p>
+          <a:p>
+            <a:pPr lvl="1"/>
+            <a:r>
+              <a:rPr lang="en-US" dirty="0" smtClean="0"/>
+              <a:t>Low price</a:t>
+            </a:r>
+            <a:endParaRPr lang="en-US" dirty="0"/>
+          </a:p>
+        </p:txBody>
+      </p:sp>
+      <p:sp>
+        <p:nvSpPr>
+          <p:cNvPr id="4" name="Date Placeholder 3"/>
+          <p:cNvSpPr>
+            <a:spLocks noGrp="1"/>
+          </p:cNvSpPr>
+          <p:nvPr>
+            <p:ph type="dt" sz="half" idx="10"/>
+          </p:nvPr>
+        </p:nvSpPr>
+        <p:spPr/>
+        <p:txBody>
+          <a:bodyPr/>
+          <a:lstStyle/>
+          <a:p>
+            <a:fld id="{15BF1EF9-59AA-43E8-8BFA-F5BFB2E45B67}" type="datetime1">
+              <a:rPr lang="en-US" smtClean="0"/>
+              <a:t>5/17/2012</a:t>
+            </a:fld>
+            <a:endParaRPr lang="en-US"/>
+          </a:p>
+        </p:txBody>
+      </p:sp>
+      <p:sp>
+        <p:nvSpPr>
+          <p:cNvPr id="5" name="Footer Placeholder 4"/>
+          <p:cNvSpPr>
+            <a:spLocks noGrp="1"/>
+          </p:cNvSpPr>
+          <p:nvPr>
+            <p:ph type="ftr" sz="quarter" idx="11"/>
+          </p:nvPr>
+        </p:nvSpPr>
+        <p:spPr/>
+        <p:txBody>
+          <a:bodyPr/>
+          <a:lstStyle/>
+          <a:p>
+            <a:r>
+              <a:rPr lang="en-US" smtClean="0"/>
+              <a:t>GSS team</a:t>
+            </a:r>
+            <a:endParaRPr lang="en-US"/>
+          </a:p>
+        </p:txBody>
+      </p:sp>
+      <p:sp>
+        <p:nvSpPr>
+          <p:cNvPr id="6" name="Slide Number Placeholder 5"/>
+          <p:cNvSpPr>
+            <a:spLocks noGrp="1"/>
+          </p:cNvSpPr>
+          <p:nvPr>
+            <p:ph type="sldNum" sz="quarter" idx="12"/>
+          </p:nvPr>
+        </p:nvSpPr>
+        <p:spPr/>
+        <p:txBody>
+          <a:bodyPr/>
+          <a:lstStyle/>
+          <a:p>
+            <a:fld id="{14E4E5E5-8462-47D9-8609-10462CB3E637}" type="slidenum">
+              <a:rPr lang="en-US" smtClean="0"/>
+              <a:t>11</a:t>
+            </a:fld>
+            <a:endParaRPr lang="en-US"/>
+          </a:p>
+        </p:txBody>
+      </p:sp>
+    </p:spTree>
+    <p:extLst>
+      <p:ext uri="{BB962C8B-B14F-4D97-AF65-F5344CB8AC3E}">
         <p14:creationId xmlns:p14="http://schemas.microsoft.com/office/powerpoint/2010/main" val="18911671"/>
       </p:ext>
     </p:extLst>
@@ -25618,7 +25794,7 @@
 </p:sld>
 </file>
 
-<file path=ppt/slides/slide11.xml><?xml version="1.0" encoding="utf-8"?>
+<file path=ppt/slides/slide12.xml><?xml version="1.0" encoding="utf-8"?>
 <p:sld xmlns:a="http://schemas.openxmlformats.org/drawingml/2006/main" xmlns:r="http://schemas.openxmlformats.org/officeDocument/2006/relationships" xmlns:p="http://schemas.openxmlformats.org/presentationml/2006/main">
   <p:cSld>
     <p:spTree>
@@ -25726,7 +25902,7 @@
           <a:p>
             <a:fld id="{DB6037FE-6732-4E5D-867D-B87392724A16}" type="datetime1">
               <a:rPr lang="en-US" smtClean="0"/>
-              <a:t>5/14/2012</a:t>
+              <a:t>5/17/2012</a:t>
             </a:fld>
             <a:endParaRPr lang="en-US"/>
           </a:p>
@@ -25772,7 +25948,7 @@
           <a:p>
             <a:fld id="{14E4E5E5-8462-47D9-8609-10462CB3E637}" type="slidenum">
               <a:rPr lang="en-US" smtClean="0"/>
-              <a:t>11</a:t>
+              <a:t>12</a:t>
             </a:fld>
             <a:endParaRPr lang="en-US"/>
           </a:p>
@@ -25791,7 +25967,7 @@
 </p:sld>
 </file>
 
-<file path=ppt/slides/slide12.xml><?xml version="1.0" encoding="utf-8"?>
+<file path=ppt/slides/slide13.xml><?xml version="1.0" encoding="utf-8"?>
 <p:sld xmlns:a="http://schemas.openxmlformats.org/drawingml/2006/main" xmlns:r="http://schemas.openxmlformats.org/officeDocument/2006/relationships" xmlns:p="http://schemas.openxmlformats.org/presentationml/2006/main">
   <p:cSld>
     <p:spTree>
@@ -25888,7 +26064,7 @@
           <a:p>
             <a:fld id="{9BD322D0-10FA-4E36-A254-EF5C4C32FCC7}" type="datetime1">
               <a:rPr lang="en-US" smtClean="0"/>
-              <a:t>5/14/2012</a:t>
+              <a:t>5/17/2012</a:t>
             </a:fld>
             <a:endParaRPr lang="en-US"/>
           </a:p>
@@ -25934,7 +26110,7 @@
           <a:p>
             <a:fld id="{14E4E5E5-8462-47D9-8609-10462CB3E637}" type="slidenum">
               <a:rPr lang="en-US" smtClean="0"/>
-              <a:t>12</a:t>
+              <a:t>13</a:t>
             </a:fld>
             <a:endParaRPr lang="en-US"/>
           </a:p>
@@ -25953,7 +26129,7 @@
 </p:sld>
 </file>
 
-<file path=ppt/slides/slide13.xml><?xml version="1.0" encoding="utf-8"?>
+<file path=ppt/slides/slide14.xml><?xml version="1.0" encoding="utf-8"?>
 <p:sld xmlns:a="http://schemas.openxmlformats.org/drawingml/2006/main" xmlns:r="http://schemas.openxmlformats.org/officeDocument/2006/relationships" xmlns:p="http://schemas.openxmlformats.org/presentationml/2006/main">
   <p:cSld>
     <p:spTree>
@@ -26015,7 +26191,7 @@
           <a:p>
             <a:fld id="{8F06AE03-0AC1-4657-9919-E6655C572269}" type="datetime1">
               <a:rPr lang="en-US" smtClean="0"/>
-              <a:t>5/14/2012</a:t>
+              <a:t>5/17/2012</a:t>
             </a:fld>
             <a:endParaRPr lang="en-US"/>
           </a:p>
@@ -26061,7 +26237,7 @@
           <a:p>
             <a:fld id="{14E4E5E5-8462-47D9-8609-10462CB3E637}" type="slidenum">
               <a:rPr lang="en-US" smtClean="0"/>
-              <a:t>13</a:t>
+              <a:t>14</a:t>
             </a:fld>
             <a:endParaRPr lang="en-US"/>
           </a:p>
@@ -26352,7 +26528,7 @@
           <a:p>
             <a:fld id="{A1036E19-F286-44E5-97E4-704582B05839}" type="datetime1">
               <a:rPr lang="en-US" smtClean="0"/>
-              <a:t>5/14/2012</a:t>
+              <a:t>5/17/2012</a:t>
             </a:fld>
             <a:endParaRPr lang="en-US"/>
           </a:p>
@@ -26760,7 +26936,7 @@
           <a:p>
             <a:fld id="{CCF57FDC-4358-4ADC-AEF3-2D972A9EF4D4}" type="datetime1">
               <a:rPr lang="en-US" smtClean="0"/>
-              <a:t>5/14/2012</a:t>
+              <a:t>5/17/2012</a:t>
             </a:fld>
             <a:endParaRPr lang="en-US"/>
           </a:p>
@@ -26887,7 +27063,92 @@
           <a:bodyPr/>
           <a:lstStyle/>
           <a:p>
-            <a:endParaRPr lang="en-US" dirty="0"/>
+            <a:r>
+              <a:rPr lang="en-US" dirty="0" smtClean="0"/>
+              <a:t>Reality of Gas shop in Vietnam</a:t>
+            </a:r>
+          </a:p>
+          <a:p>
+            <a:pPr lvl="1"/>
+            <a:r>
+              <a:rPr lang="en-US" dirty="0" smtClean="0"/>
+              <a:t>Order by telephone</a:t>
+            </a:r>
+          </a:p>
+          <a:p>
+            <a:pPr lvl="1"/>
+            <a:r>
+              <a:rPr lang="en-US" dirty="0" smtClean="0"/>
+              <a:t>Storing data problem</a:t>
+            </a:r>
+          </a:p>
+          <a:p>
+            <a:pPr lvl="1"/>
+            <a:r>
+              <a:rPr lang="en-US" dirty="0" smtClean="0"/>
+              <a:t>Low service when communicate with customer by telephone</a:t>
+            </a:r>
+          </a:p>
+          <a:p>
+            <a:pPr marL="274320" lvl="1" indent="-274320">
+              <a:buClr>
+                <a:schemeClr val="accent3"/>
+              </a:buClr>
+              <a:buSzPct val="95000"/>
+            </a:pPr>
+            <a:r>
+              <a:rPr lang="en-US" sz="2600" dirty="0" smtClean="0"/>
+              <a:t>Opportunities</a:t>
+            </a:r>
+          </a:p>
+          <a:p>
+            <a:pPr marL="548640" lvl="2" indent="-274320">
+              <a:buClr>
+                <a:schemeClr val="accent3"/>
+              </a:buClr>
+              <a:buSzPct val="95000"/>
+            </a:pPr>
+            <a:r>
+              <a:rPr lang="en-US" sz="2300" dirty="0" smtClean="0"/>
+              <a:t>Develop a system support communicate with customer by telephone</a:t>
+            </a:r>
+          </a:p>
+          <a:p>
+            <a:pPr marL="274320" lvl="2" indent="0">
+              <a:buClr>
+                <a:schemeClr val="accent3"/>
+              </a:buClr>
+              <a:buSzPct val="95000"/>
+              <a:buNone/>
+            </a:pPr>
+            <a:r>
+              <a:rPr lang="en-US" sz="2300" dirty="0" smtClean="0"/>
+              <a:t> </a:t>
+            </a:r>
+          </a:p>
+          <a:p>
+            <a:pPr marL="274320" lvl="1" indent="-274320">
+              <a:buClr>
+                <a:schemeClr val="accent3"/>
+              </a:buClr>
+              <a:buSzPct val="95000"/>
+            </a:pPr>
+            <a:endParaRPr lang="en-US" sz="2600" dirty="0" smtClean="0"/>
+          </a:p>
+          <a:p>
+            <a:pPr marL="548640" lvl="2" indent="-274320">
+              <a:buClr>
+                <a:schemeClr val="accent3"/>
+              </a:buClr>
+              <a:buSzPct val="95000"/>
+            </a:pPr>
+            <a:endParaRPr lang="en-US" sz="2300" dirty="0"/>
+          </a:p>
+          <a:p>
+            <a:pPr marL="393192" lvl="1" indent="0">
+              <a:buNone/>
+            </a:pPr>
+            <a:endParaRPr lang="en-US" dirty="0" smtClean="0"/>
           </a:p>
         </p:txBody>
       </p:sp>
@@ -26908,7 +27169,7 @@
           <a:p>
             <a:fld id="{6AC91228-189C-44EC-8729-EA7125D85ABE}" type="datetime1">
               <a:rPr lang="en-US" smtClean="0"/>
-              <a:t>5/14/2012</a:t>
+              <a:t>5/17/2012</a:t>
             </a:fld>
             <a:endParaRPr lang="en-US"/>
           </a:p>
@@ -27099,7 +27360,7 @@
           <a:p>
             <a:fld id="{31AC48A5-B833-47D1-B57F-861E29A4793D}" type="datetime1">
               <a:rPr lang="en-US" smtClean="0"/>
-              <a:t>5/14/2012</a:t>
+              <a:t>5/17/2012</a:t>
             </a:fld>
             <a:endParaRPr lang="en-US"/>
           </a:p>
@@ -27260,7 +27521,7 @@
           <a:p>
             <a:fld id="{18724129-D33C-4879-BEDB-6D69DD65561E}" type="datetime1">
               <a:rPr lang="en-US" smtClean="0"/>
-              <a:t>5/14/2012</a:t>
+              <a:t>5/17/2012</a:t>
             </a:fld>
             <a:endParaRPr lang="en-US"/>
           </a:p>
@@ -27448,7 +27709,7 @@
           <a:p>
             <a:fld id="{E5F4B1B0-EB06-4AE5-87F3-70DF03304DDA}" type="datetime1">
               <a:rPr lang="en-US" smtClean="0"/>
-              <a:t>5/14/2012</a:t>
+              <a:t>5/17/2012</a:t>
             </a:fld>
             <a:endParaRPr lang="en-US"/>
           </a:p>
@@ -27691,7 +27952,7 @@
           <a:p>
             <a:fld id="{27617D52-C74C-419B-815C-E6DA0E50C3C2}" type="datetime1">
               <a:rPr lang="en-US" smtClean="0"/>
-              <a:t>5/14/2012</a:t>
+              <a:t>5/17/2012</a:t>
             </a:fld>
             <a:endParaRPr lang="en-US"/>
           </a:p>
@@ -27922,7 +28183,7 @@
           <a:p>
             <a:fld id="{3109E3BF-77F7-4D7E-8C20-D344B8E873E6}" type="datetime1">
               <a:rPr lang="en-US" smtClean="0"/>
-              <a:t>5/14/2012</a:t>
+              <a:t>5/17/2012</a:t>
             </a:fld>
             <a:endParaRPr lang="en-US"/>
           </a:p>

</xml_diff>